<commit_message>
Update Subjective Methods of Measuring QoE.pptx
</commit_message>
<xml_diff>
--- a/Advanced Multimedia Information Processing and Communications/16 (25) Subjective Methods for Measuring QoE/Subjective Methods of Measuring QoE.pptx
+++ b/Advanced Multimedia Information Processing and Communications/16 (25) Subjective Methods for Measuring QoE/Subjective Methods of Measuring QoE.pptx
@@ -273,6 +273,11 @@
       </a:defRPr>
     </a:lvl9pPr>
   </p:defaultTextStyle>
+  <p:extLst>
+    <p:ext uri="{EFAFB233-063F-42B5-8137-9DF3F51BA10A}">
+      <p15:sldGuideLst xmlns:p15="http://schemas.microsoft.com/office/powerpoint/2012/main"/>
+    </p:ext>
+  </p:extLst>
 </p:presentation>
 </file>
 
@@ -2157,8 +2162,8 @@
         </p:nvSpPr>
         <p:spPr>
           <a:xfrm>
-            <a:off x="1143000" y="685800"/>
-            <a:ext cx="4572000" cy="3429000"/>
+            <a:off x="1006475" y="685800"/>
+            <a:ext cx="4845050" cy="3429000"/>
           </a:xfrm>
           <a:custGeom>
             <a:avLst/>
@@ -43358,7 +43363,7 @@
                   <a:srgbClr val="808080"/>
                 </a:solidFill>
               </a:rPr>
-              <a:t>25.10.2020</a:t>
+              <a:t>21.11.2021</a:t>
             </a:fld>
             <a:endParaRPr sz="1600" b="0" i="0" u="none" strike="noStrike" cap="none" dirty="0">
               <a:solidFill>
@@ -46483,64 +46488,6 @@
       </p:grpSpPr>
       <p:sp>
         <p:nvSpPr>
-          <p:cNvPr id="366" name="Google Shape;366;p62"/>
-          <p:cNvSpPr txBox="1"/>
-          <p:nvPr/>
-        </p:nvSpPr>
-        <p:spPr>
-          <a:xfrm>
-            <a:off x="920100" y="2184400"/>
-            <a:ext cx="9085200" cy="4563300"/>
-          </a:xfrm>
-          <a:prstGeom prst="rect">
-            <a:avLst/>
-          </a:prstGeom>
-          <a:noFill/>
-          <a:ln>
-            <a:noFill/>
-          </a:ln>
-        </p:spPr>
-        <p:txBody>
-          <a:bodyPr spcFirstLastPara="1" wrap="square" lIns="52125" tIns="52125" rIns="52125" bIns="52125" anchor="ctr" anchorCtr="0">
-            <a:noAutofit/>
-          </a:bodyPr>
-          <a:lstStyle/>
-          <a:p>
-            <a:pPr marL="0" lvl="0" indent="0" algn="ctr" rtl="0">
-              <a:spcBef>
-                <a:spcPts val="0"/>
-              </a:spcBef>
-              <a:spcAft>
-                <a:spcPts val="0"/>
-              </a:spcAft>
-              <a:buClr>
-                <a:schemeClr val="dk1"/>
-              </a:buClr>
-              <a:buSzPts val="1100"/>
-              <a:buFont typeface="Arial"/>
-              <a:buNone/>
-            </a:pPr>
-            <a:r>
-              <a:rPr lang="en-US" sz="6000" u="sng">
-                <a:solidFill>
-                  <a:srgbClr val="1155CC"/>
-                </a:solidFill>
-                <a:hlinkClick r:id="rId3">
-                  <a:extLst>
-                    <a:ext uri="{A12FA001-AC4F-418D-AE19-62706E023703}">
-                      <ahyp:hlinkClr xmlns:ahyp="http://schemas.microsoft.com/office/drawing/2018/hyperlinkcolor" val="tx"/>
-                    </a:ext>
-                  </a:extLst>
-                </a:hlinkClick>
-              </a:rPr>
-              <a:t>qoe.leszcz.uk</a:t>
-            </a:r>
-            <a:endParaRPr sz="6000"/>
-          </a:p>
-        </p:txBody>
-      </p:sp>
-      <p:sp>
-        <p:nvSpPr>
           <p:cNvPr id="367" name="Google Shape;367;p62"/>
           <p:cNvSpPr/>
           <p:nvPr/>
@@ -46633,6 +46580,59 @@
       </p:sp>
       <p:sp>
         <p:nvSpPr>
+          <p:cNvPr id="2" name="Title 1">
+            <a:extLst>
+              <a:ext uri="{FF2B5EF4-FFF2-40B4-BE49-F238E27FC236}">
+                <a16:creationId xmlns:a16="http://schemas.microsoft.com/office/drawing/2014/main" id="{3DDB5B19-3BD5-3E46-9CF6-0185D4FC71CC}"/>
+              </a:ext>
+            </a:extLst>
+          </p:cNvPr>
+          <p:cNvSpPr>
+            <a:spLocks noGrp="1"/>
+          </p:cNvSpPr>
+          <p:nvPr>
+            <p:ph type="title"/>
+          </p:nvPr>
+        </p:nvSpPr>
+        <p:spPr/>
+        <p:txBody>
+          <a:bodyPr/>
+          <a:lstStyle/>
+          <a:p>
+            <a:r>
+              <a:rPr lang="en-GB" dirty="0"/>
+              <a:t>Let’s do the Test!</a:t>
+            </a:r>
+          </a:p>
+        </p:txBody>
+      </p:sp>
+      <p:sp>
+        <p:nvSpPr>
+          <p:cNvPr id="3" name="Text Placeholder 2">
+            <a:extLst>
+              <a:ext uri="{FF2B5EF4-FFF2-40B4-BE49-F238E27FC236}">
+                <a16:creationId xmlns:a16="http://schemas.microsoft.com/office/drawing/2014/main" id="{A98E3EAB-F5A6-FD45-B4E5-C9EBDC80DE77}"/>
+              </a:ext>
+            </a:extLst>
+          </p:cNvPr>
+          <p:cNvSpPr>
+            <a:spLocks noGrp="1"/>
+          </p:cNvSpPr>
+          <p:nvPr>
+            <p:ph type="body" idx="1"/>
+          </p:nvPr>
+        </p:nvSpPr>
+        <p:spPr/>
+        <p:txBody>
+          <a:bodyPr/>
+          <a:lstStyle/>
+          <a:p>
+            <a:endParaRPr lang="en-GB" dirty="0"/>
+          </a:p>
+        </p:txBody>
+      </p:sp>
+      <p:sp>
+        <p:nvSpPr>
           <p:cNvPr id="369" name="Google Shape;369;p62"/>
           <p:cNvSpPr txBox="1">
             <a:spLocks noGrp="1"/>
@@ -46642,10 +46642,6 @@
           </p:nvPr>
         </p:nvSpPr>
         <p:spPr>
-          <a:xfrm>
-            <a:off x="9542463" y="6891338"/>
-            <a:ext cx="344400" cy="325500"/>
-          </a:xfrm>
           <a:prstGeom prst="rect">
             <a:avLst/>
           </a:prstGeom>
@@ -46674,48 +46670,6 @@
               <a:t>14</a:t>
             </a:fld>
             <a:endParaRPr/>
-          </a:p>
-        </p:txBody>
-      </p:sp>
-      <p:sp>
-        <p:nvSpPr>
-          <p:cNvPr id="370" name="Google Shape;370;p62"/>
-          <p:cNvSpPr txBox="1"/>
-          <p:nvPr/>
-        </p:nvSpPr>
-        <p:spPr>
-          <a:xfrm>
-            <a:off x="797738" y="352988"/>
-            <a:ext cx="9085200" cy="1260600"/>
-          </a:xfrm>
-          <a:prstGeom prst="rect">
-            <a:avLst/>
-          </a:prstGeom>
-          <a:noFill/>
-          <a:ln>
-            <a:noFill/>
-          </a:ln>
-        </p:spPr>
-        <p:txBody>
-          <a:bodyPr spcFirstLastPara="1" wrap="square" lIns="52125" tIns="52125" rIns="52125" bIns="52125" anchor="ctr" anchorCtr="0">
-            <a:noAutofit/>
-          </a:bodyPr>
-          <a:lstStyle/>
-          <a:p>
-            <a:pPr marL="0" lvl="0" indent="0" algn="ctr" rtl="0">
-              <a:spcBef>
-                <a:spcPts val="0"/>
-              </a:spcBef>
-              <a:spcAft>
-                <a:spcPts val="0"/>
-              </a:spcAft>
-              <a:buNone/>
-            </a:pPr>
-            <a:r>
-              <a:rPr lang="en-US" sz="5000" b="1"/>
-              <a:t>Let’s do the Test!</a:t>
-            </a:r>
-            <a:endParaRPr sz="5000" b="1"/>
           </a:p>
         </p:txBody>
       </p:sp>

</xml_diff>